<commit_message>
Add section defining "agentic" in threat intel context
Updated presentation with definition section for agentic systems.

Co-Authored-By: Claude Sonnet 4.5 <noreply@anthropic.com>
</commit_message>
<xml_diff>
--- a/Agentic_Threat_Intel/2026-01-21_DePaul-Presentation.pptx
+++ b/Agentic_Threat_Intel/2026-01-21_DePaul-Presentation.pptx
@@ -5,34 +5,40 @@
     <p:sldMasterId id="2147483648" r:id="rId1"/>
   </p:sldMasterIdLst>
   <p:sldIdLst>
-    <p:sldId id="268" r:id="rId2"/>
-    <p:sldId id="282" r:id="rId3"/>
-    <p:sldId id="256" r:id="rId4"/>
-    <p:sldId id="258" r:id="rId5"/>
-    <p:sldId id="257" r:id="rId6"/>
-    <p:sldId id="260" r:id="rId7"/>
-    <p:sldId id="259" r:id="rId8"/>
-    <p:sldId id="261" r:id="rId9"/>
-    <p:sldId id="262" r:id="rId10"/>
-    <p:sldId id="284" r:id="rId11"/>
-    <p:sldId id="264" r:id="rId12"/>
-    <p:sldId id="265" r:id="rId13"/>
-    <p:sldId id="266" r:id="rId14"/>
-    <p:sldId id="283" r:id="rId15"/>
-    <p:sldId id="267" r:id="rId16"/>
-    <p:sldId id="269" r:id="rId17"/>
-    <p:sldId id="281" r:id="rId18"/>
-    <p:sldId id="270" r:id="rId19"/>
-    <p:sldId id="271" r:id="rId20"/>
-    <p:sldId id="272" r:id="rId21"/>
-    <p:sldId id="273" r:id="rId22"/>
-    <p:sldId id="274" r:id="rId23"/>
-    <p:sldId id="277" r:id="rId24"/>
-    <p:sldId id="275" r:id="rId25"/>
-    <p:sldId id="276" r:id="rId26"/>
-    <p:sldId id="278" r:id="rId27"/>
-    <p:sldId id="279" r:id="rId28"/>
-    <p:sldId id="280" r:id="rId29"/>
+    <p:sldId id="256" r:id="rId2"/>
+    <p:sldId id="268" r:id="rId3"/>
+    <p:sldId id="282" r:id="rId4"/>
+    <p:sldId id="285" r:id="rId5"/>
+    <p:sldId id="258" r:id="rId6"/>
+    <p:sldId id="257" r:id="rId7"/>
+    <p:sldId id="260" r:id="rId8"/>
+    <p:sldId id="259" r:id="rId9"/>
+    <p:sldId id="261" r:id="rId10"/>
+    <p:sldId id="287" r:id="rId11"/>
+    <p:sldId id="288" r:id="rId12"/>
+    <p:sldId id="289" r:id="rId13"/>
+    <p:sldId id="290" r:id="rId14"/>
+    <p:sldId id="286" r:id="rId15"/>
+    <p:sldId id="262" r:id="rId16"/>
+    <p:sldId id="284" r:id="rId17"/>
+    <p:sldId id="264" r:id="rId18"/>
+    <p:sldId id="265" r:id="rId19"/>
+    <p:sldId id="266" r:id="rId20"/>
+    <p:sldId id="283" r:id="rId21"/>
+    <p:sldId id="267" r:id="rId22"/>
+    <p:sldId id="269" r:id="rId23"/>
+    <p:sldId id="281" r:id="rId24"/>
+    <p:sldId id="270" r:id="rId25"/>
+    <p:sldId id="271" r:id="rId26"/>
+    <p:sldId id="272" r:id="rId27"/>
+    <p:sldId id="273" r:id="rId28"/>
+    <p:sldId id="274" r:id="rId29"/>
+    <p:sldId id="277" r:id="rId30"/>
+    <p:sldId id="275" r:id="rId31"/>
+    <p:sldId id="276" r:id="rId32"/>
+    <p:sldId id="278" r:id="rId33"/>
+    <p:sldId id="279" r:id="rId34"/>
+    <p:sldId id="280" r:id="rId35"/>
   </p:sldIdLst>
   <p:sldSz cx="12192000" cy="6858000"/>
   <p:notesSz cx="6858000" cy="9144000"/>
@@ -3344,6 +3350,875 @@
     </p:bg>
     <p:spTree>
       <p:nvGrpSpPr>
+        <p:cNvPr id="1" name=""/>
+        <p:cNvGrpSpPr/>
+        <p:nvPr/>
+      </p:nvGrpSpPr>
+      <p:grpSpPr>
+        <a:xfrm>
+          <a:off x="0" y="0"/>
+          <a:ext cx="0" cy="0"/>
+          <a:chOff x="0" y="0"/>
+          <a:chExt cx="0" cy="0"/>
+        </a:xfrm>
+      </p:grpSpPr>
+      <p:sp>
+        <p:nvSpPr>
+          <p:cNvPr id="2" name="Title 1">
+            <a:extLst>
+              <a:ext uri="{FF2B5EF4-FFF2-40B4-BE49-F238E27FC236}">
+                <a16:creationId xmlns:a16="http://schemas.microsoft.com/office/drawing/2014/main" id="{89BB42BB-592E-5235-9C0D-ECAFA567F99E}"/>
+              </a:ext>
+            </a:extLst>
+          </p:cNvPr>
+          <p:cNvSpPr>
+            <a:spLocks noGrp="1"/>
+          </p:cNvSpPr>
+          <p:nvPr>
+            <p:ph type="ctrTitle"/>
+          </p:nvPr>
+        </p:nvSpPr>
+        <p:spPr>
+          <a:xfrm>
+            <a:off x="257432" y="3126260"/>
+            <a:ext cx="11677135" cy="1193800"/>
+          </a:xfrm>
+        </p:spPr>
+        <p:txBody>
+          <a:bodyPr>
+            <a:noAutofit/>
+          </a:bodyPr>
+          <a:lstStyle/>
+          <a:p>
+            <a:r>
+              <a:rPr lang="en-US" sz="4000" dirty="0">
+                <a:solidFill>
+                  <a:srgbClr val="EBDCB3"/>
+                </a:solidFill>
+              </a:rPr>
+              <a:t>Building an </a:t>
+            </a:r>
+            <a:br>
+              <a:rPr lang="en-US" sz="7200" dirty="0">
+                <a:solidFill>
+                  <a:srgbClr val="EBDCB3"/>
+                </a:solidFill>
+              </a:rPr>
+            </a:br>
+            <a:r>
+              <a:rPr lang="en-US" sz="7200" b="1" dirty="0">
+                <a:solidFill>
+                  <a:srgbClr val="EBDCB3"/>
+                </a:solidFill>
+              </a:rPr>
+              <a:t>Agentic Threat Intel System</a:t>
+            </a:r>
+            <a:endParaRPr lang="en-US" sz="7200" b="1" i="1" dirty="0">
+              <a:solidFill>
+                <a:srgbClr val="EBDCB3"/>
+              </a:solidFill>
+            </a:endParaRPr>
+          </a:p>
+        </p:txBody>
+      </p:sp>
+    </p:spTree>
+    <p:extLst>
+      <p:ext uri="{BB962C8B-B14F-4D97-AF65-F5344CB8AC3E}">
+        <p14:creationId xmlns:p14="http://schemas.microsoft.com/office/powerpoint/2010/main" val="531412031"/>
+      </p:ext>
+    </p:extLst>
+  </p:cSld>
+  <p:clrMapOvr>
+    <a:masterClrMapping/>
+  </p:clrMapOvr>
+</p:sld>
+</file>
+
+<file path=ppt/slides/slide10.xml><?xml version="1.0" encoding="utf-8"?>
+<p:sld xmlns:a="http://schemas.openxmlformats.org/drawingml/2006/main" xmlns:r="http://schemas.openxmlformats.org/officeDocument/2006/relationships" xmlns:p="http://schemas.openxmlformats.org/presentationml/2006/main">
+  <p:cSld>
+    <p:bg>
+      <p:bgPr>
+        <a:solidFill>
+          <a:srgbClr val="EBDCB3"/>
+        </a:solidFill>
+        <a:effectLst/>
+      </p:bgPr>
+    </p:bg>
+    <p:spTree>
+      <p:nvGrpSpPr>
+        <p:cNvPr id="1" name="">
+          <a:extLst>
+            <a:ext uri="{FF2B5EF4-FFF2-40B4-BE49-F238E27FC236}">
+              <a16:creationId xmlns:a16="http://schemas.microsoft.com/office/drawing/2014/main" id="{C9D6A0D5-C35A-E0CF-1111-A3621EC633CD}"/>
+            </a:ext>
+          </a:extLst>
+        </p:cNvPr>
+        <p:cNvGrpSpPr/>
+        <p:nvPr/>
+      </p:nvGrpSpPr>
+      <p:grpSpPr>
+        <a:xfrm>
+          <a:off x="0" y="0"/>
+          <a:ext cx="0" cy="0"/>
+          <a:chOff x="0" y="0"/>
+          <a:chExt cx="0" cy="0"/>
+        </a:xfrm>
+      </p:grpSpPr>
+      <p:sp>
+        <p:nvSpPr>
+          <p:cNvPr id="2" name="Title 1">
+            <a:extLst>
+              <a:ext uri="{FF2B5EF4-FFF2-40B4-BE49-F238E27FC236}">
+                <a16:creationId xmlns:a16="http://schemas.microsoft.com/office/drawing/2014/main" id="{02E84A37-4069-093C-5790-996E9EBFF7D3}"/>
+              </a:ext>
+            </a:extLst>
+          </p:cNvPr>
+          <p:cNvSpPr>
+            <a:spLocks noGrp="1"/>
+          </p:cNvSpPr>
+          <p:nvPr>
+            <p:ph type="ctrTitle"/>
+          </p:nvPr>
+        </p:nvSpPr>
+        <p:spPr>
+          <a:xfrm>
+            <a:off x="1524000" y="2743200"/>
+            <a:ext cx="9144000" cy="1193800"/>
+          </a:xfrm>
+        </p:spPr>
+        <p:txBody>
+          <a:bodyPr/>
+          <a:lstStyle/>
+          <a:p>
+            <a:r>
+              <a:rPr lang="en-US" dirty="0">
+                <a:solidFill>
+                  <a:srgbClr val="282828"/>
+                </a:solidFill>
+              </a:rPr>
+              <a:t>The system is empowered:</a:t>
+            </a:r>
+          </a:p>
+        </p:txBody>
+      </p:sp>
+    </p:spTree>
+    <p:extLst>
+      <p:ext uri="{BB962C8B-B14F-4D97-AF65-F5344CB8AC3E}">
+        <p14:creationId xmlns:p14="http://schemas.microsoft.com/office/powerpoint/2010/main" val="3096382915"/>
+      </p:ext>
+    </p:extLst>
+  </p:cSld>
+  <p:clrMapOvr>
+    <a:masterClrMapping/>
+  </p:clrMapOvr>
+</p:sld>
+</file>
+
+<file path=ppt/slides/slide11.xml><?xml version="1.0" encoding="utf-8"?>
+<p:sld xmlns:a="http://schemas.openxmlformats.org/drawingml/2006/main" xmlns:r="http://schemas.openxmlformats.org/officeDocument/2006/relationships" xmlns:p="http://schemas.openxmlformats.org/presentationml/2006/main">
+  <p:cSld>
+    <p:bg>
+      <p:bgPr>
+        <a:solidFill>
+          <a:srgbClr val="EBDCB3"/>
+        </a:solidFill>
+        <a:effectLst/>
+      </p:bgPr>
+    </p:bg>
+    <p:spTree>
+      <p:nvGrpSpPr>
+        <p:cNvPr id="1" name="">
+          <a:extLst>
+            <a:ext uri="{FF2B5EF4-FFF2-40B4-BE49-F238E27FC236}">
+              <a16:creationId xmlns:a16="http://schemas.microsoft.com/office/drawing/2014/main" id="{469B0A6F-85C7-948A-36BE-07842271E24E}"/>
+            </a:ext>
+          </a:extLst>
+        </p:cNvPr>
+        <p:cNvGrpSpPr/>
+        <p:nvPr/>
+      </p:nvGrpSpPr>
+      <p:grpSpPr>
+        <a:xfrm>
+          <a:off x="0" y="0"/>
+          <a:ext cx="0" cy="0"/>
+          <a:chOff x="0" y="0"/>
+          <a:chExt cx="0" cy="0"/>
+        </a:xfrm>
+      </p:grpSpPr>
+      <p:sp>
+        <p:nvSpPr>
+          <p:cNvPr id="2" name="Title 1">
+            <a:extLst>
+              <a:ext uri="{FF2B5EF4-FFF2-40B4-BE49-F238E27FC236}">
+                <a16:creationId xmlns:a16="http://schemas.microsoft.com/office/drawing/2014/main" id="{5E3A5006-627E-BAF0-96A9-6AE1E59F89A1}"/>
+              </a:ext>
+            </a:extLst>
+          </p:cNvPr>
+          <p:cNvSpPr>
+            <a:spLocks noGrp="1"/>
+          </p:cNvSpPr>
+          <p:nvPr>
+            <p:ph type="ctrTitle"/>
+          </p:nvPr>
+        </p:nvSpPr>
+        <p:spPr>
+          <a:xfrm>
+            <a:off x="1524000" y="3039763"/>
+            <a:ext cx="9144000" cy="1193800"/>
+          </a:xfrm>
+        </p:spPr>
+        <p:txBody>
+          <a:bodyPr>
+            <a:noAutofit/>
+          </a:bodyPr>
+          <a:lstStyle/>
+          <a:p>
+            <a:r>
+              <a:rPr lang="en-US" dirty="0">
+                <a:solidFill>
+                  <a:srgbClr val="282828"/>
+                </a:solidFill>
+              </a:rPr>
+              <a:t>It can make choices </a:t>
+            </a:r>
+            <a:br>
+              <a:rPr lang="en-US" dirty="0">
+                <a:solidFill>
+                  <a:srgbClr val="282828"/>
+                </a:solidFill>
+              </a:rPr>
+            </a:br>
+            <a:r>
+              <a:rPr lang="en-US" dirty="0">
+                <a:solidFill>
+                  <a:srgbClr val="282828"/>
+                </a:solidFill>
+              </a:rPr>
+              <a:t>and take actions…</a:t>
+            </a:r>
+          </a:p>
+        </p:txBody>
+      </p:sp>
+    </p:spTree>
+    <p:extLst>
+      <p:ext uri="{BB962C8B-B14F-4D97-AF65-F5344CB8AC3E}">
+        <p14:creationId xmlns:p14="http://schemas.microsoft.com/office/powerpoint/2010/main" val="4155514012"/>
+      </p:ext>
+    </p:extLst>
+  </p:cSld>
+  <p:clrMapOvr>
+    <a:masterClrMapping/>
+  </p:clrMapOvr>
+</p:sld>
+</file>
+
+<file path=ppt/slides/slide12.xml><?xml version="1.0" encoding="utf-8"?>
+<p:sld xmlns:a="http://schemas.openxmlformats.org/drawingml/2006/main" xmlns:r="http://schemas.openxmlformats.org/officeDocument/2006/relationships" xmlns:p="http://schemas.openxmlformats.org/presentationml/2006/main">
+  <p:cSld>
+    <p:bg>
+      <p:bgPr>
+        <a:solidFill>
+          <a:srgbClr val="EBDCB3"/>
+        </a:solidFill>
+        <a:effectLst/>
+      </p:bgPr>
+    </p:bg>
+    <p:spTree>
+      <p:nvGrpSpPr>
+        <p:cNvPr id="1" name="">
+          <a:extLst>
+            <a:ext uri="{FF2B5EF4-FFF2-40B4-BE49-F238E27FC236}">
+              <a16:creationId xmlns:a16="http://schemas.microsoft.com/office/drawing/2014/main" id="{8E4D2C1A-1AEE-6525-5C3D-C77B4410D4FE}"/>
+            </a:ext>
+          </a:extLst>
+        </p:cNvPr>
+        <p:cNvGrpSpPr/>
+        <p:nvPr/>
+      </p:nvGrpSpPr>
+      <p:grpSpPr>
+        <a:xfrm>
+          <a:off x="0" y="0"/>
+          <a:ext cx="0" cy="0"/>
+          <a:chOff x="0" y="0"/>
+          <a:chExt cx="0" cy="0"/>
+        </a:xfrm>
+      </p:grpSpPr>
+      <p:sp>
+        <p:nvSpPr>
+          <p:cNvPr id="2" name="Title 1">
+            <a:extLst>
+              <a:ext uri="{FF2B5EF4-FFF2-40B4-BE49-F238E27FC236}">
+                <a16:creationId xmlns:a16="http://schemas.microsoft.com/office/drawing/2014/main" id="{1FB300CB-B08E-ECFA-5B24-991A87B391AA}"/>
+              </a:ext>
+            </a:extLst>
+          </p:cNvPr>
+          <p:cNvSpPr>
+            <a:spLocks noGrp="1"/>
+          </p:cNvSpPr>
+          <p:nvPr>
+            <p:ph type="ctrTitle"/>
+          </p:nvPr>
+        </p:nvSpPr>
+        <p:spPr>
+          <a:xfrm>
+            <a:off x="1334529" y="2832100"/>
+            <a:ext cx="9522941" cy="1193800"/>
+          </a:xfrm>
+        </p:spPr>
+        <p:txBody>
+          <a:bodyPr>
+            <a:noAutofit/>
+          </a:bodyPr>
+          <a:lstStyle/>
+          <a:p>
+            <a:r>
+              <a:rPr lang="en-US" dirty="0">
+                <a:solidFill>
+                  <a:srgbClr val="282828"/>
+                </a:solidFill>
+              </a:rPr>
+              <a:t>…without consulting a human.</a:t>
+            </a:r>
+          </a:p>
+        </p:txBody>
+      </p:sp>
+    </p:spTree>
+    <p:extLst>
+      <p:ext uri="{BB962C8B-B14F-4D97-AF65-F5344CB8AC3E}">
+        <p14:creationId xmlns:p14="http://schemas.microsoft.com/office/powerpoint/2010/main" val="728944757"/>
+      </p:ext>
+    </p:extLst>
+  </p:cSld>
+  <p:clrMapOvr>
+    <a:masterClrMapping/>
+  </p:clrMapOvr>
+</p:sld>
+</file>
+
+<file path=ppt/slides/slide13.xml><?xml version="1.0" encoding="utf-8"?>
+<p:sld xmlns:a="http://schemas.openxmlformats.org/drawingml/2006/main" xmlns:r="http://schemas.openxmlformats.org/officeDocument/2006/relationships" xmlns:p="http://schemas.openxmlformats.org/presentationml/2006/main">
+  <p:cSld>
+    <p:bg>
+      <p:bgPr>
+        <a:solidFill>
+          <a:srgbClr val="EBDCB3"/>
+        </a:solidFill>
+        <a:effectLst/>
+      </p:bgPr>
+    </p:bg>
+    <p:spTree>
+      <p:nvGrpSpPr>
+        <p:cNvPr id="1" name="">
+          <a:extLst>
+            <a:ext uri="{FF2B5EF4-FFF2-40B4-BE49-F238E27FC236}">
+              <a16:creationId xmlns:a16="http://schemas.microsoft.com/office/drawing/2014/main" id="{D3D51F07-77E5-CCF7-8E16-EEFDCCFF91A3}"/>
+            </a:ext>
+          </a:extLst>
+        </p:cNvPr>
+        <p:cNvGrpSpPr/>
+        <p:nvPr/>
+      </p:nvGrpSpPr>
+      <p:grpSpPr>
+        <a:xfrm>
+          <a:off x="0" y="0"/>
+          <a:ext cx="0" cy="0"/>
+          <a:chOff x="0" y="0"/>
+          <a:chExt cx="0" cy="0"/>
+        </a:xfrm>
+      </p:grpSpPr>
+      <p:pic>
+        <p:nvPicPr>
+          <p:cNvPr id="1026" name="Picture 2" descr="Eva!: 10 Behind-The-Scenes Facts About WALL-E">
+            <a:extLst>
+              <a:ext uri="{FF2B5EF4-FFF2-40B4-BE49-F238E27FC236}">
+                <a16:creationId xmlns:a16="http://schemas.microsoft.com/office/drawing/2014/main" id="{D99EC944-8731-1800-A6A6-1747F5536A9D}"/>
+              </a:ext>
+            </a:extLst>
+          </p:cNvPr>
+          <p:cNvPicPr>
+            <a:picLocks noChangeAspect="1" noChangeArrowheads="1"/>
+          </p:cNvPicPr>
+          <p:nvPr/>
+        </p:nvPicPr>
+        <p:blipFill>
+          <a:blip r:embed="rId2">
+            <a:extLst>
+              <a:ext uri="{28A0092B-C50C-407E-A947-70E740481C1C}">
+                <a14:useLocalDpi xmlns:a14="http://schemas.microsoft.com/office/drawing/2010/main" val="0"/>
+              </a:ext>
+            </a:extLst>
+          </a:blip>
+          <a:srcRect/>
+          <a:stretch>
+            <a:fillRect/>
+          </a:stretch>
+        </p:blipFill>
+        <p:spPr bwMode="auto">
+          <a:xfrm>
+            <a:off x="0" y="0"/>
+            <a:ext cx="12192000" cy="6858000"/>
+          </a:xfrm>
+          <a:prstGeom prst="rect">
+            <a:avLst/>
+          </a:prstGeom>
+          <a:noFill/>
+          <a:extLst>
+            <a:ext uri="{909E8E84-426E-40DD-AFC4-6F175D3DCCD1}">
+              <a14:hiddenFill xmlns:a14="http://schemas.microsoft.com/office/drawing/2010/main">
+                <a:solidFill>
+                  <a:srgbClr val="FFFFFF"/>
+                </a:solidFill>
+              </a14:hiddenFill>
+            </a:ext>
+          </a:extLst>
+        </p:spPr>
+      </p:pic>
+    </p:spTree>
+    <p:extLst>
+      <p:ext uri="{BB962C8B-B14F-4D97-AF65-F5344CB8AC3E}">
+        <p14:creationId xmlns:p14="http://schemas.microsoft.com/office/powerpoint/2010/main" val="2805354054"/>
+      </p:ext>
+    </p:extLst>
+  </p:cSld>
+  <p:clrMapOvr>
+    <a:masterClrMapping/>
+  </p:clrMapOvr>
+</p:sld>
+</file>
+
+<file path=ppt/slides/slide14.xml><?xml version="1.0" encoding="utf-8"?>
+<p:sld xmlns:a="http://schemas.openxmlformats.org/drawingml/2006/main" xmlns:r="http://schemas.openxmlformats.org/officeDocument/2006/relationships" xmlns:p="http://schemas.openxmlformats.org/presentationml/2006/main">
+  <p:cSld>
+    <p:bg>
+      <p:bgPr>
+        <a:solidFill>
+          <a:srgbClr val="282828"/>
+        </a:solidFill>
+        <a:effectLst/>
+      </p:bgPr>
+    </p:bg>
+    <p:spTree>
+      <p:nvGrpSpPr>
+        <p:cNvPr id="1" name="">
+          <a:extLst>
+            <a:ext uri="{FF2B5EF4-FFF2-40B4-BE49-F238E27FC236}">
+              <a16:creationId xmlns:a16="http://schemas.microsoft.com/office/drawing/2014/main" id="{8F2D4021-5D08-1BB3-DB71-059B4947F657}"/>
+            </a:ext>
+          </a:extLst>
+        </p:cNvPr>
+        <p:cNvGrpSpPr/>
+        <p:nvPr/>
+      </p:nvGrpSpPr>
+      <p:grpSpPr>
+        <a:xfrm>
+          <a:off x="0" y="0"/>
+          <a:ext cx="0" cy="0"/>
+          <a:chOff x="0" y="0"/>
+          <a:chExt cx="0" cy="0"/>
+        </a:xfrm>
+      </p:grpSpPr>
+      <p:sp>
+        <p:nvSpPr>
+          <p:cNvPr id="2" name="Title 1">
+            <a:extLst>
+              <a:ext uri="{FF2B5EF4-FFF2-40B4-BE49-F238E27FC236}">
+                <a16:creationId xmlns:a16="http://schemas.microsoft.com/office/drawing/2014/main" id="{98F6FD18-4856-C554-1EE1-2D9BCE7B7BD8}"/>
+              </a:ext>
+            </a:extLst>
+          </p:cNvPr>
+          <p:cNvSpPr>
+            <a:spLocks noGrp="1"/>
+          </p:cNvSpPr>
+          <p:nvPr>
+            <p:ph type="ctrTitle"/>
+          </p:nvPr>
+        </p:nvSpPr>
+        <p:spPr>
+          <a:xfrm>
+            <a:off x="1524000" y="2743200"/>
+            <a:ext cx="9144000" cy="1193800"/>
+          </a:xfrm>
+        </p:spPr>
+        <p:txBody>
+          <a:bodyPr/>
+          <a:lstStyle/>
+          <a:p>
+            <a:r>
+              <a:rPr lang="en-US" dirty="0">
+                <a:solidFill>
+                  <a:srgbClr val="EBDCB3"/>
+                </a:solidFill>
+              </a:rPr>
+              <a:t>So I built </a:t>
+            </a:r>
+            <a:r>
+              <a:rPr lang="en-US" i="1" dirty="0">
+                <a:solidFill>
+                  <a:srgbClr val="EBDCB3"/>
+                </a:solidFill>
+              </a:rPr>
+              <a:t>a thing</a:t>
+            </a:r>
+          </a:p>
+        </p:txBody>
+      </p:sp>
+    </p:spTree>
+    <p:extLst>
+      <p:ext uri="{BB962C8B-B14F-4D97-AF65-F5344CB8AC3E}">
+        <p14:creationId xmlns:p14="http://schemas.microsoft.com/office/powerpoint/2010/main" val="3082030806"/>
+      </p:ext>
+    </p:extLst>
+  </p:cSld>
+  <p:clrMapOvr>
+    <a:masterClrMapping/>
+  </p:clrMapOvr>
+</p:sld>
+</file>
+
+<file path=ppt/slides/slide15.xml><?xml version="1.0" encoding="utf-8"?>
+<p:sld xmlns:a="http://schemas.openxmlformats.org/drawingml/2006/main" xmlns:r="http://schemas.openxmlformats.org/officeDocument/2006/relationships" xmlns:p="http://schemas.openxmlformats.org/presentationml/2006/main">
+  <p:cSld>
+    <p:spTree>
+      <p:nvGrpSpPr>
+        <p:cNvPr id="1" name="">
+          <a:extLst>
+            <a:ext uri="{FF2B5EF4-FFF2-40B4-BE49-F238E27FC236}">
+              <a16:creationId xmlns:a16="http://schemas.microsoft.com/office/drawing/2014/main" id="{25B1A5A2-C726-FE4D-CECD-6DF17FA4062A}"/>
+            </a:ext>
+          </a:extLst>
+        </p:cNvPr>
+        <p:cNvGrpSpPr/>
+        <p:nvPr/>
+      </p:nvGrpSpPr>
+      <p:grpSpPr>
+        <a:xfrm>
+          <a:off x="0" y="0"/>
+          <a:ext cx="0" cy="0"/>
+          <a:chOff x="0" y="0"/>
+          <a:chExt cx="0" cy="0"/>
+        </a:xfrm>
+      </p:grpSpPr>
+      <p:pic>
+        <p:nvPicPr>
+          <p:cNvPr id="11" name="Picture 10" descr="A screenshot of a computer&#10;&#10;AI-generated content may be incorrect.">
+            <a:extLst>
+              <a:ext uri="{FF2B5EF4-FFF2-40B4-BE49-F238E27FC236}">
+                <a16:creationId xmlns:a16="http://schemas.microsoft.com/office/drawing/2014/main" id="{4AD2C7E2-51B6-44B5-EEF9-0EA95DCF3BA4}"/>
+              </a:ext>
+            </a:extLst>
+          </p:cNvPr>
+          <p:cNvPicPr>
+            <a:picLocks noChangeAspect="1"/>
+          </p:cNvPicPr>
+          <p:nvPr/>
+        </p:nvPicPr>
+        <p:blipFill>
+          <a:blip r:embed="rId2"/>
+          <a:stretch>
+            <a:fillRect/>
+          </a:stretch>
+        </p:blipFill>
+        <p:spPr>
+          <a:xfrm>
+            <a:off x="-15300" y="-12357"/>
+            <a:ext cx="12345460" cy="6969211"/>
+          </a:xfrm>
+          <a:prstGeom prst="rect">
+            <a:avLst/>
+          </a:prstGeom>
+        </p:spPr>
+      </p:pic>
+    </p:spTree>
+    <p:extLst>
+      <p:ext uri="{BB962C8B-B14F-4D97-AF65-F5344CB8AC3E}">
+        <p14:creationId xmlns:p14="http://schemas.microsoft.com/office/powerpoint/2010/main" val="3431341621"/>
+      </p:ext>
+    </p:extLst>
+  </p:cSld>
+  <p:clrMapOvr>
+    <a:masterClrMapping/>
+  </p:clrMapOvr>
+</p:sld>
+</file>
+
+<file path=ppt/slides/slide16.xml><?xml version="1.0" encoding="utf-8"?>
+<p:sld xmlns:a="http://schemas.openxmlformats.org/drawingml/2006/main" xmlns:r="http://schemas.openxmlformats.org/officeDocument/2006/relationships" xmlns:p="http://schemas.openxmlformats.org/presentationml/2006/main">
+  <p:cSld>
+    <p:spTree>
+      <p:nvGrpSpPr>
+        <p:cNvPr id="1" name="">
+          <a:extLst>
+            <a:ext uri="{FF2B5EF4-FFF2-40B4-BE49-F238E27FC236}">
+              <a16:creationId xmlns:a16="http://schemas.microsoft.com/office/drawing/2014/main" id="{A5ED974C-C2F1-71A7-05FF-12AEB256875B}"/>
+            </a:ext>
+          </a:extLst>
+        </p:cNvPr>
+        <p:cNvGrpSpPr/>
+        <p:nvPr/>
+      </p:nvGrpSpPr>
+      <p:grpSpPr>
+        <a:xfrm>
+          <a:off x="0" y="0"/>
+          <a:ext cx="0" cy="0"/>
+          <a:chOff x="0" y="0"/>
+          <a:chExt cx="0" cy="0"/>
+        </a:xfrm>
+      </p:grpSpPr>
+      <p:pic>
+        <p:nvPicPr>
+          <p:cNvPr id="5" name="Picture 4">
+            <a:extLst>
+              <a:ext uri="{FF2B5EF4-FFF2-40B4-BE49-F238E27FC236}">
+                <a16:creationId xmlns:a16="http://schemas.microsoft.com/office/drawing/2014/main" id="{BC148967-0016-B32D-1DA1-47F851A127C6}"/>
+              </a:ext>
+            </a:extLst>
+          </p:cNvPr>
+          <p:cNvPicPr>
+            <a:picLocks noChangeAspect="1"/>
+          </p:cNvPicPr>
+          <p:nvPr/>
+        </p:nvPicPr>
+        <p:blipFill>
+          <a:blip r:embed="rId2"/>
+          <a:stretch>
+            <a:fillRect/>
+          </a:stretch>
+        </p:blipFill>
+        <p:spPr>
+          <a:xfrm>
+            <a:off x="-137898" y="-67962"/>
+            <a:ext cx="12763700" cy="6993924"/>
+          </a:xfrm>
+          <a:prstGeom prst="rect">
+            <a:avLst/>
+          </a:prstGeom>
+        </p:spPr>
+      </p:pic>
+    </p:spTree>
+    <p:extLst>
+      <p:ext uri="{BB962C8B-B14F-4D97-AF65-F5344CB8AC3E}">
+        <p14:creationId xmlns:p14="http://schemas.microsoft.com/office/powerpoint/2010/main" val="2158183884"/>
+      </p:ext>
+    </p:extLst>
+  </p:cSld>
+  <p:clrMapOvr>
+    <a:masterClrMapping/>
+  </p:clrMapOvr>
+</p:sld>
+</file>
+
+<file path=ppt/slides/slide17.xml><?xml version="1.0" encoding="utf-8"?>
+<p:sld xmlns:a="http://schemas.openxmlformats.org/drawingml/2006/main" xmlns:r="http://schemas.openxmlformats.org/officeDocument/2006/relationships" xmlns:p="http://schemas.openxmlformats.org/presentationml/2006/main">
+  <p:cSld>
+    <p:spTree>
+      <p:nvGrpSpPr>
+        <p:cNvPr id="1" name="">
+          <a:extLst>
+            <a:ext uri="{FF2B5EF4-FFF2-40B4-BE49-F238E27FC236}">
+              <a16:creationId xmlns:a16="http://schemas.microsoft.com/office/drawing/2014/main" id="{791F9135-52CA-EB93-2B5E-A17FFBA9185F}"/>
+            </a:ext>
+          </a:extLst>
+        </p:cNvPr>
+        <p:cNvGrpSpPr/>
+        <p:nvPr/>
+      </p:nvGrpSpPr>
+      <p:grpSpPr>
+        <a:xfrm>
+          <a:off x="0" y="0"/>
+          <a:ext cx="0" cy="0"/>
+          <a:chOff x="0" y="0"/>
+          <a:chExt cx="0" cy="0"/>
+        </a:xfrm>
+      </p:grpSpPr>
+      <p:pic>
+        <p:nvPicPr>
+          <p:cNvPr id="3" name="Picture 2">
+            <a:extLst>
+              <a:ext uri="{FF2B5EF4-FFF2-40B4-BE49-F238E27FC236}">
+                <a16:creationId xmlns:a16="http://schemas.microsoft.com/office/drawing/2014/main" id="{FBC35505-C7D2-E856-F080-B6B4010ECAF2}"/>
+              </a:ext>
+            </a:extLst>
+          </p:cNvPr>
+          <p:cNvPicPr>
+            <a:picLocks noChangeAspect="1"/>
+          </p:cNvPicPr>
+          <p:nvPr/>
+        </p:nvPicPr>
+        <p:blipFill>
+          <a:blip r:embed="rId2"/>
+          <a:stretch>
+            <a:fillRect/>
+          </a:stretch>
+        </p:blipFill>
+        <p:spPr>
+          <a:xfrm>
+            <a:off x="-135926" y="-24065"/>
+            <a:ext cx="13202221" cy="6911469"/>
+          </a:xfrm>
+          <a:prstGeom prst="rect">
+            <a:avLst/>
+          </a:prstGeom>
+        </p:spPr>
+      </p:pic>
+    </p:spTree>
+    <p:extLst>
+      <p:ext uri="{BB962C8B-B14F-4D97-AF65-F5344CB8AC3E}">
+        <p14:creationId xmlns:p14="http://schemas.microsoft.com/office/powerpoint/2010/main" val="1113903019"/>
+      </p:ext>
+    </p:extLst>
+  </p:cSld>
+  <p:clrMapOvr>
+    <a:masterClrMapping/>
+  </p:clrMapOvr>
+</p:sld>
+</file>
+
+<file path=ppt/slides/slide18.xml><?xml version="1.0" encoding="utf-8"?>
+<p:sld xmlns:a="http://schemas.openxmlformats.org/drawingml/2006/main" xmlns:r="http://schemas.openxmlformats.org/officeDocument/2006/relationships" xmlns:p="http://schemas.openxmlformats.org/presentationml/2006/main">
+  <p:cSld>
+    <p:spTree>
+      <p:nvGrpSpPr>
+        <p:cNvPr id="1" name="">
+          <a:extLst>
+            <a:ext uri="{FF2B5EF4-FFF2-40B4-BE49-F238E27FC236}">
+              <a16:creationId xmlns:a16="http://schemas.microsoft.com/office/drawing/2014/main" id="{6F53FED5-F0FD-287F-D70D-247664511A42}"/>
+            </a:ext>
+          </a:extLst>
+        </p:cNvPr>
+        <p:cNvGrpSpPr/>
+        <p:nvPr/>
+      </p:nvGrpSpPr>
+      <p:grpSpPr>
+        <a:xfrm>
+          <a:off x="0" y="0"/>
+          <a:ext cx="0" cy="0"/>
+          <a:chOff x="0" y="0"/>
+          <a:chExt cx="0" cy="0"/>
+        </a:xfrm>
+      </p:grpSpPr>
+      <p:pic>
+        <p:nvPicPr>
+          <p:cNvPr id="2" name="Picture 1">
+            <a:extLst>
+              <a:ext uri="{FF2B5EF4-FFF2-40B4-BE49-F238E27FC236}">
+                <a16:creationId xmlns:a16="http://schemas.microsoft.com/office/drawing/2014/main" id="{1907615F-72F9-62DC-2DA3-C9F22908F079}"/>
+              </a:ext>
+            </a:extLst>
+          </p:cNvPr>
+          <p:cNvPicPr>
+            <a:picLocks noChangeAspect="1"/>
+          </p:cNvPicPr>
+          <p:nvPr/>
+        </p:nvPicPr>
+        <p:blipFill>
+          <a:blip r:embed="rId2"/>
+          <a:stretch>
+            <a:fillRect/>
+          </a:stretch>
+        </p:blipFill>
+        <p:spPr>
+          <a:xfrm>
+            <a:off x="-132347" y="-12033"/>
+            <a:ext cx="14123627" cy="6916923"/>
+          </a:xfrm>
+          <a:prstGeom prst="rect">
+            <a:avLst/>
+          </a:prstGeom>
+        </p:spPr>
+      </p:pic>
+    </p:spTree>
+    <p:extLst>
+      <p:ext uri="{BB962C8B-B14F-4D97-AF65-F5344CB8AC3E}">
+        <p14:creationId xmlns:p14="http://schemas.microsoft.com/office/powerpoint/2010/main" val="1867498818"/>
+      </p:ext>
+    </p:extLst>
+  </p:cSld>
+  <p:clrMapOvr>
+    <a:masterClrMapping/>
+  </p:clrMapOvr>
+</p:sld>
+</file>
+
+<file path=ppt/slides/slide19.xml><?xml version="1.0" encoding="utf-8"?>
+<p:sld xmlns:a="http://schemas.openxmlformats.org/drawingml/2006/main" xmlns:r="http://schemas.openxmlformats.org/officeDocument/2006/relationships" xmlns:p="http://schemas.openxmlformats.org/presentationml/2006/main">
+  <p:cSld>
+    <p:spTree>
+      <p:nvGrpSpPr>
+        <p:cNvPr id="1" name="">
+          <a:extLst>
+            <a:ext uri="{FF2B5EF4-FFF2-40B4-BE49-F238E27FC236}">
+              <a16:creationId xmlns:a16="http://schemas.microsoft.com/office/drawing/2014/main" id="{EA58E9B5-72E1-D257-55CF-4CB528800EBD}"/>
+            </a:ext>
+          </a:extLst>
+        </p:cNvPr>
+        <p:cNvGrpSpPr/>
+        <p:nvPr/>
+      </p:nvGrpSpPr>
+      <p:grpSpPr>
+        <a:xfrm>
+          <a:off x="0" y="0"/>
+          <a:ext cx="0" cy="0"/>
+          <a:chOff x="0" y="0"/>
+          <a:chExt cx="0" cy="0"/>
+        </a:xfrm>
+      </p:grpSpPr>
+      <p:pic>
+        <p:nvPicPr>
+          <p:cNvPr id="3" name="Picture 2">
+            <a:extLst>
+              <a:ext uri="{FF2B5EF4-FFF2-40B4-BE49-F238E27FC236}">
+                <a16:creationId xmlns:a16="http://schemas.microsoft.com/office/drawing/2014/main" id="{FF86C379-5137-9601-CA27-0DB4CC6F9B77}"/>
+              </a:ext>
+            </a:extLst>
+          </p:cNvPr>
+          <p:cNvPicPr>
+            <a:picLocks noChangeAspect="1"/>
+          </p:cNvPicPr>
+          <p:nvPr/>
+        </p:nvPicPr>
+        <p:blipFill>
+          <a:blip r:embed="rId2"/>
+          <a:stretch>
+            <a:fillRect/>
+          </a:stretch>
+        </p:blipFill>
+        <p:spPr>
+          <a:xfrm>
+            <a:off x="-12032" y="-79528"/>
+            <a:ext cx="12308306" cy="7142908"/>
+          </a:xfrm>
+          <a:prstGeom prst="rect">
+            <a:avLst/>
+          </a:prstGeom>
+        </p:spPr>
+      </p:pic>
+    </p:spTree>
+    <p:extLst>
+      <p:ext uri="{BB962C8B-B14F-4D97-AF65-F5344CB8AC3E}">
+        <p14:creationId xmlns:p14="http://schemas.microsoft.com/office/powerpoint/2010/main" val="1961246669"/>
+      </p:ext>
+    </p:extLst>
+  </p:cSld>
+  <p:clrMapOvr>
+    <a:masterClrMapping/>
+  </p:clrMapOvr>
+</p:sld>
+</file>
+
+<file path=ppt/slides/slide2.xml><?xml version="1.0" encoding="utf-8"?>
+<p:sld xmlns:a="http://schemas.openxmlformats.org/drawingml/2006/main" xmlns:r="http://schemas.openxmlformats.org/officeDocument/2006/relationships" xmlns:p="http://schemas.openxmlformats.org/presentationml/2006/main">
+  <p:cSld>
+    <p:bg>
+      <p:bgPr>
+        <a:solidFill>
+          <a:srgbClr val="282828"/>
+        </a:solidFill>
+        <a:effectLst/>
+      </p:bgPr>
+    </p:bg>
+    <p:spTree>
+      <p:nvGrpSpPr>
         <p:cNvPr id="1" name="">
           <a:extLst>
             <a:ext uri="{FF2B5EF4-FFF2-40B4-BE49-F238E27FC236}">
@@ -3509,271 +4384,7 @@
 </p:sld>
 </file>
 
-<file path=ppt/slides/slide10.xml><?xml version="1.0" encoding="utf-8"?>
-<p:sld xmlns:a="http://schemas.openxmlformats.org/drawingml/2006/main" xmlns:r="http://schemas.openxmlformats.org/officeDocument/2006/relationships" xmlns:p="http://schemas.openxmlformats.org/presentationml/2006/main">
-  <p:cSld>
-    <p:spTree>
-      <p:nvGrpSpPr>
-        <p:cNvPr id="1" name="">
-          <a:extLst>
-            <a:ext uri="{FF2B5EF4-FFF2-40B4-BE49-F238E27FC236}">
-              <a16:creationId xmlns:a16="http://schemas.microsoft.com/office/drawing/2014/main" id="{A5ED974C-C2F1-71A7-05FF-12AEB256875B}"/>
-            </a:ext>
-          </a:extLst>
-        </p:cNvPr>
-        <p:cNvGrpSpPr/>
-        <p:nvPr/>
-      </p:nvGrpSpPr>
-      <p:grpSpPr>
-        <a:xfrm>
-          <a:off x="0" y="0"/>
-          <a:ext cx="0" cy="0"/>
-          <a:chOff x="0" y="0"/>
-          <a:chExt cx="0" cy="0"/>
-        </a:xfrm>
-      </p:grpSpPr>
-      <p:pic>
-        <p:nvPicPr>
-          <p:cNvPr id="5" name="Picture 4">
-            <a:extLst>
-              <a:ext uri="{FF2B5EF4-FFF2-40B4-BE49-F238E27FC236}">
-                <a16:creationId xmlns:a16="http://schemas.microsoft.com/office/drawing/2014/main" id="{BC148967-0016-B32D-1DA1-47F851A127C6}"/>
-              </a:ext>
-            </a:extLst>
-          </p:cNvPr>
-          <p:cNvPicPr>
-            <a:picLocks noChangeAspect="1"/>
-          </p:cNvPicPr>
-          <p:nvPr/>
-        </p:nvPicPr>
-        <p:blipFill>
-          <a:blip r:embed="rId2"/>
-          <a:stretch>
-            <a:fillRect/>
-          </a:stretch>
-        </p:blipFill>
-        <p:spPr>
-          <a:xfrm>
-            <a:off x="-137898" y="-67962"/>
-            <a:ext cx="12763700" cy="6993924"/>
-          </a:xfrm>
-          <a:prstGeom prst="rect">
-            <a:avLst/>
-          </a:prstGeom>
-        </p:spPr>
-      </p:pic>
-    </p:spTree>
-    <p:extLst>
-      <p:ext uri="{BB962C8B-B14F-4D97-AF65-F5344CB8AC3E}">
-        <p14:creationId xmlns:p14="http://schemas.microsoft.com/office/powerpoint/2010/main" val="2158183884"/>
-      </p:ext>
-    </p:extLst>
-  </p:cSld>
-  <p:clrMapOvr>
-    <a:masterClrMapping/>
-  </p:clrMapOvr>
-</p:sld>
-</file>
-
-<file path=ppt/slides/slide11.xml><?xml version="1.0" encoding="utf-8"?>
-<p:sld xmlns:a="http://schemas.openxmlformats.org/drawingml/2006/main" xmlns:r="http://schemas.openxmlformats.org/officeDocument/2006/relationships" xmlns:p="http://schemas.openxmlformats.org/presentationml/2006/main">
-  <p:cSld>
-    <p:spTree>
-      <p:nvGrpSpPr>
-        <p:cNvPr id="1" name="">
-          <a:extLst>
-            <a:ext uri="{FF2B5EF4-FFF2-40B4-BE49-F238E27FC236}">
-              <a16:creationId xmlns:a16="http://schemas.microsoft.com/office/drawing/2014/main" id="{791F9135-52CA-EB93-2B5E-A17FFBA9185F}"/>
-            </a:ext>
-          </a:extLst>
-        </p:cNvPr>
-        <p:cNvGrpSpPr/>
-        <p:nvPr/>
-      </p:nvGrpSpPr>
-      <p:grpSpPr>
-        <a:xfrm>
-          <a:off x="0" y="0"/>
-          <a:ext cx="0" cy="0"/>
-          <a:chOff x="0" y="0"/>
-          <a:chExt cx="0" cy="0"/>
-        </a:xfrm>
-      </p:grpSpPr>
-      <p:pic>
-        <p:nvPicPr>
-          <p:cNvPr id="3" name="Picture 2">
-            <a:extLst>
-              <a:ext uri="{FF2B5EF4-FFF2-40B4-BE49-F238E27FC236}">
-                <a16:creationId xmlns:a16="http://schemas.microsoft.com/office/drawing/2014/main" id="{FBC35505-C7D2-E856-F080-B6B4010ECAF2}"/>
-              </a:ext>
-            </a:extLst>
-          </p:cNvPr>
-          <p:cNvPicPr>
-            <a:picLocks noChangeAspect="1"/>
-          </p:cNvPicPr>
-          <p:nvPr/>
-        </p:nvPicPr>
-        <p:blipFill>
-          <a:blip r:embed="rId2"/>
-          <a:stretch>
-            <a:fillRect/>
-          </a:stretch>
-        </p:blipFill>
-        <p:spPr>
-          <a:xfrm>
-            <a:off x="-135926" y="-24065"/>
-            <a:ext cx="13202221" cy="6911469"/>
-          </a:xfrm>
-          <a:prstGeom prst="rect">
-            <a:avLst/>
-          </a:prstGeom>
-        </p:spPr>
-      </p:pic>
-    </p:spTree>
-    <p:extLst>
-      <p:ext uri="{BB962C8B-B14F-4D97-AF65-F5344CB8AC3E}">
-        <p14:creationId xmlns:p14="http://schemas.microsoft.com/office/powerpoint/2010/main" val="1113903019"/>
-      </p:ext>
-    </p:extLst>
-  </p:cSld>
-  <p:clrMapOvr>
-    <a:masterClrMapping/>
-  </p:clrMapOvr>
-</p:sld>
-</file>
-
-<file path=ppt/slides/slide12.xml><?xml version="1.0" encoding="utf-8"?>
-<p:sld xmlns:a="http://schemas.openxmlformats.org/drawingml/2006/main" xmlns:r="http://schemas.openxmlformats.org/officeDocument/2006/relationships" xmlns:p="http://schemas.openxmlformats.org/presentationml/2006/main">
-  <p:cSld>
-    <p:spTree>
-      <p:nvGrpSpPr>
-        <p:cNvPr id="1" name="">
-          <a:extLst>
-            <a:ext uri="{FF2B5EF4-FFF2-40B4-BE49-F238E27FC236}">
-              <a16:creationId xmlns:a16="http://schemas.microsoft.com/office/drawing/2014/main" id="{6F53FED5-F0FD-287F-D70D-247664511A42}"/>
-            </a:ext>
-          </a:extLst>
-        </p:cNvPr>
-        <p:cNvGrpSpPr/>
-        <p:nvPr/>
-      </p:nvGrpSpPr>
-      <p:grpSpPr>
-        <a:xfrm>
-          <a:off x="0" y="0"/>
-          <a:ext cx="0" cy="0"/>
-          <a:chOff x="0" y="0"/>
-          <a:chExt cx="0" cy="0"/>
-        </a:xfrm>
-      </p:grpSpPr>
-      <p:pic>
-        <p:nvPicPr>
-          <p:cNvPr id="2" name="Picture 1">
-            <a:extLst>
-              <a:ext uri="{FF2B5EF4-FFF2-40B4-BE49-F238E27FC236}">
-                <a16:creationId xmlns:a16="http://schemas.microsoft.com/office/drawing/2014/main" id="{1907615F-72F9-62DC-2DA3-C9F22908F079}"/>
-              </a:ext>
-            </a:extLst>
-          </p:cNvPr>
-          <p:cNvPicPr>
-            <a:picLocks noChangeAspect="1"/>
-          </p:cNvPicPr>
-          <p:nvPr/>
-        </p:nvPicPr>
-        <p:blipFill>
-          <a:blip r:embed="rId2"/>
-          <a:stretch>
-            <a:fillRect/>
-          </a:stretch>
-        </p:blipFill>
-        <p:spPr>
-          <a:xfrm>
-            <a:off x="-132347" y="-12033"/>
-            <a:ext cx="14123627" cy="6916923"/>
-          </a:xfrm>
-          <a:prstGeom prst="rect">
-            <a:avLst/>
-          </a:prstGeom>
-        </p:spPr>
-      </p:pic>
-    </p:spTree>
-    <p:extLst>
-      <p:ext uri="{BB962C8B-B14F-4D97-AF65-F5344CB8AC3E}">
-        <p14:creationId xmlns:p14="http://schemas.microsoft.com/office/powerpoint/2010/main" val="1867498818"/>
-      </p:ext>
-    </p:extLst>
-  </p:cSld>
-  <p:clrMapOvr>
-    <a:masterClrMapping/>
-  </p:clrMapOvr>
-</p:sld>
-</file>
-
-<file path=ppt/slides/slide13.xml><?xml version="1.0" encoding="utf-8"?>
-<p:sld xmlns:a="http://schemas.openxmlformats.org/drawingml/2006/main" xmlns:r="http://schemas.openxmlformats.org/officeDocument/2006/relationships" xmlns:p="http://schemas.openxmlformats.org/presentationml/2006/main">
-  <p:cSld>
-    <p:spTree>
-      <p:nvGrpSpPr>
-        <p:cNvPr id="1" name="">
-          <a:extLst>
-            <a:ext uri="{FF2B5EF4-FFF2-40B4-BE49-F238E27FC236}">
-              <a16:creationId xmlns:a16="http://schemas.microsoft.com/office/drawing/2014/main" id="{EA58E9B5-72E1-D257-55CF-4CB528800EBD}"/>
-            </a:ext>
-          </a:extLst>
-        </p:cNvPr>
-        <p:cNvGrpSpPr/>
-        <p:nvPr/>
-      </p:nvGrpSpPr>
-      <p:grpSpPr>
-        <a:xfrm>
-          <a:off x="0" y="0"/>
-          <a:ext cx="0" cy="0"/>
-          <a:chOff x="0" y="0"/>
-          <a:chExt cx="0" cy="0"/>
-        </a:xfrm>
-      </p:grpSpPr>
-      <p:pic>
-        <p:nvPicPr>
-          <p:cNvPr id="3" name="Picture 2">
-            <a:extLst>
-              <a:ext uri="{FF2B5EF4-FFF2-40B4-BE49-F238E27FC236}">
-                <a16:creationId xmlns:a16="http://schemas.microsoft.com/office/drawing/2014/main" id="{FF86C379-5137-9601-CA27-0DB4CC6F9B77}"/>
-              </a:ext>
-            </a:extLst>
-          </p:cNvPr>
-          <p:cNvPicPr>
-            <a:picLocks noChangeAspect="1"/>
-          </p:cNvPicPr>
-          <p:nvPr/>
-        </p:nvPicPr>
-        <p:blipFill>
-          <a:blip r:embed="rId2"/>
-          <a:stretch>
-            <a:fillRect/>
-          </a:stretch>
-        </p:blipFill>
-        <p:spPr>
-          <a:xfrm>
-            <a:off x="-12032" y="-79528"/>
-            <a:ext cx="12308306" cy="7142908"/>
-          </a:xfrm>
-          <a:prstGeom prst="rect">
-            <a:avLst/>
-          </a:prstGeom>
-        </p:spPr>
-      </p:pic>
-    </p:spTree>
-    <p:extLst>
-      <p:ext uri="{BB962C8B-B14F-4D97-AF65-F5344CB8AC3E}">
-        <p14:creationId xmlns:p14="http://schemas.microsoft.com/office/powerpoint/2010/main" val="1961246669"/>
-      </p:ext>
-    </p:extLst>
-  </p:cSld>
-  <p:clrMapOvr>
-    <a:masterClrMapping/>
-  </p:clrMapOvr>
-</p:sld>
-</file>
-
-<file path=ppt/slides/slide14.xml><?xml version="1.0" encoding="utf-8"?>
+<file path=ppt/slides/slide20.xml><?xml version="1.0" encoding="utf-8"?>
 <p:sld xmlns:a="http://schemas.openxmlformats.org/drawingml/2006/main" xmlns:r="http://schemas.openxmlformats.org/officeDocument/2006/relationships" xmlns:p="http://schemas.openxmlformats.org/presentationml/2006/main">
   <p:cSld>
     <p:bg>
@@ -3847,7 +4458,7 @@
 </p:sld>
 </file>
 
-<file path=ppt/slides/slide15.xml><?xml version="1.0" encoding="utf-8"?>
+<file path=ppt/slides/slide21.xml><?xml version="1.0" encoding="utf-8"?>
 <p:sld xmlns:a="http://schemas.openxmlformats.org/drawingml/2006/main" xmlns:r="http://schemas.openxmlformats.org/officeDocument/2006/relationships" xmlns:p="http://schemas.openxmlformats.org/presentationml/2006/main">
   <p:cSld>
     <p:bg>
@@ -3912,7 +4523,15 @@
                   <a:srgbClr val="EBDCB3"/>
                 </a:solidFill>
               </a:rPr>
-              <a:t>The patterns</a:t>
+              <a:t>The </a:t>
+            </a:r>
+            <a:r>
+              <a:rPr lang="en-US" b="1" i="1" dirty="0">
+                <a:solidFill>
+                  <a:srgbClr val="EBDCB3"/>
+                </a:solidFill>
+              </a:rPr>
+              <a:t>patterns</a:t>
             </a:r>
           </a:p>
         </p:txBody>
@@ -3930,7 +4549,7 @@
 </p:sld>
 </file>
 
-<file path=ppt/slides/slide16.xml><?xml version="1.0" encoding="utf-8"?>
+<file path=ppt/slides/slide22.xml><?xml version="1.0" encoding="utf-8"?>
 <p:sld xmlns:a="http://schemas.openxmlformats.org/drawingml/2006/main" xmlns:r="http://schemas.openxmlformats.org/officeDocument/2006/relationships" xmlns:p="http://schemas.openxmlformats.org/presentationml/2006/main">
   <p:cSld>
     <p:bg>
@@ -4011,7 +4630,7 @@
 </p:sld>
 </file>
 
-<file path=ppt/slides/slide17.xml><?xml version="1.0" encoding="utf-8"?>
+<file path=ppt/slides/slide23.xml><?xml version="1.0" encoding="utf-8"?>
 <p:sld xmlns:a="http://schemas.openxmlformats.org/drawingml/2006/main" xmlns:r="http://schemas.openxmlformats.org/officeDocument/2006/relationships" xmlns:p="http://schemas.openxmlformats.org/presentationml/2006/main">
   <p:cSld>
     <p:bg>
@@ -4189,7 +4808,7 @@
 </p:sld>
 </file>
 
-<file path=ppt/slides/slide18.xml><?xml version="1.0" encoding="utf-8"?>
+<file path=ppt/slides/slide24.xml><?xml version="1.0" encoding="utf-8"?>
 <p:sld xmlns:a="http://schemas.openxmlformats.org/drawingml/2006/main" xmlns:r="http://schemas.openxmlformats.org/officeDocument/2006/relationships" xmlns:p="http://schemas.openxmlformats.org/presentationml/2006/main">
   <p:cSld>
     <p:bg>
@@ -4302,7 +4921,7 @@
 </p:sld>
 </file>
 
-<file path=ppt/slides/slide19.xml><?xml version="1.0" encoding="utf-8"?>
+<file path=ppt/slides/slide25.xml><?xml version="1.0" encoding="utf-8"?>
 <p:sld xmlns:a="http://schemas.openxmlformats.org/drawingml/2006/main" xmlns:r="http://schemas.openxmlformats.org/officeDocument/2006/relationships" xmlns:p="http://schemas.openxmlformats.org/presentationml/2006/main">
   <p:cSld>
     <p:bg>
@@ -4383,204 +5002,7 @@
 </p:sld>
 </file>
 
-<file path=ppt/slides/slide2.xml><?xml version="1.0" encoding="utf-8"?>
-<p:sld xmlns:a="http://schemas.openxmlformats.org/drawingml/2006/main" xmlns:r="http://schemas.openxmlformats.org/officeDocument/2006/relationships" xmlns:p="http://schemas.openxmlformats.org/presentationml/2006/main">
-  <p:cSld>
-    <p:bg>
-      <p:bgPr>
-        <a:solidFill>
-          <a:srgbClr val="EBDCB3"/>
-        </a:solidFill>
-        <a:effectLst/>
-      </p:bgPr>
-    </p:bg>
-    <p:spTree>
-      <p:nvGrpSpPr>
-        <p:cNvPr id="1" name="">
-          <a:extLst>
-            <a:ext uri="{FF2B5EF4-FFF2-40B4-BE49-F238E27FC236}">
-              <a16:creationId xmlns:a16="http://schemas.microsoft.com/office/drawing/2014/main" id="{0F48F373-2938-66B6-0241-AEA7F1014D0F}"/>
-            </a:ext>
-          </a:extLst>
-        </p:cNvPr>
-        <p:cNvGrpSpPr/>
-        <p:nvPr/>
-      </p:nvGrpSpPr>
-      <p:grpSpPr>
-        <a:xfrm>
-          <a:off x="0" y="0"/>
-          <a:ext cx="0" cy="0"/>
-          <a:chOff x="0" y="0"/>
-          <a:chExt cx="0" cy="0"/>
-        </a:xfrm>
-      </p:grpSpPr>
-      <p:sp>
-        <p:nvSpPr>
-          <p:cNvPr id="3" name="Title 1">
-            <a:extLst>
-              <a:ext uri="{FF2B5EF4-FFF2-40B4-BE49-F238E27FC236}">
-                <a16:creationId xmlns:a16="http://schemas.microsoft.com/office/drawing/2014/main" id="{46D6C389-9F22-A4E6-AB31-4A7936B0CCA2}"/>
-              </a:ext>
-            </a:extLst>
-          </p:cNvPr>
-          <p:cNvSpPr txBox="1">
-            <a:spLocks/>
-          </p:cNvSpPr>
-          <p:nvPr/>
-        </p:nvSpPr>
-        <p:spPr>
-          <a:xfrm>
-            <a:off x="1046205" y="1988580"/>
-            <a:ext cx="10099589" cy="4363651"/>
-          </a:xfrm>
-          <a:prstGeom prst="rect">
-            <a:avLst/>
-          </a:prstGeom>
-        </p:spPr>
-        <p:txBody>
-          <a:bodyPr vert="horz" lIns="91440" tIns="45720" rIns="91440" bIns="45720" rtlCol="0" anchor="b">
-            <a:noAutofit/>
-          </a:bodyPr>
-          <a:lstStyle>
-            <a:lvl1pPr algn="ctr" defTabSz="914400" rtl="0" eaLnBrk="1" latinLnBrk="0" hangingPunct="1">
-              <a:lnSpc>
-                <a:spcPct val="90000"/>
-              </a:lnSpc>
-              <a:spcBef>
-                <a:spcPct val="0"/>
-              </a:spcBef>
-              <a:buNone/>
-              <a:defRPr sz="6000" kern="1200">
-                <a:solidFill>
-                  <a:schemeClr val="tx1"/>
-                </a:solidFill>
-                <a:latin typeface="+mj-lt"/>
-                <a:ea typeface="+mj-ea"/>
-                <a:cs typeface="+mj-cs"/>
-              </a:defRPr>
-            </a:lvl1pPr>
-          </a:lstStyle>
-          <a:p>
-            <a:r>
-              <a:rPr lang="en-US" dirty="0" err="1">
-                <a:solidFill>
-                  <a:srgbClr val="282828"/>
-                </a:solidFill>
-              </a:rPr>
-              <a:t>daemon.ajvanbeest.com</a:t>
-            </a:r>
-            <a:br>
-              <a:rPr lang="en-US" dirty="0">
-                <a:solidFill>
-                  <a:srgbClr val="282828"/>
-                </a:solidFill>
-              </a:rPr>
-            </a:br>
-            <a:br>
-              <a:rPr lang="en-US" dirty="0">
-                <a:solidFill>
-                  <a:srgbClr val="282828"/>
-                </a:solidFill>
-              </a:rPr>
-            </a:br>
-            <a:r>
-              <a:rPr lang="en-US" dirty="0" err="1">
-                <a:solidFill>
-                  <a:srgbClr val="282828"/>
-                </a:solidFill>
-              </a:rPr>
-              <a:t>github.com</a:t>
-            </a:r>
-            <a:r>
-              <a:rPr lang="en-US" dirty="0">
-                <a:solidFill>
-                  <a:srgbClr val="282828"/>
-                </a:solidFill>
-              </a:rPr>
-              <a:t>/theaj42</a:t>
-            </a:r>
-            <a:br>
-              <a:rPr lang="en-US" dirty="0">
-                <a:solidFill>
-                  <a:srgbClr val="282828"/>
-                </a:solidFill>
-              </a:rPr>
-            </a:br>
-            <a:r>
-              <a:rPr lang="en-US" dirty="0">
-                <a:solidFill>
-                  <a:srgbClr val="282828"/>
-                </a:solidFill>
-              </a:rPr>
-              <a:t>- presentations</a:t>
-            </a:r>
-            <a:br>
-              <a:rPr lang="en-US" dirty="0">
-                <a:solidFill>
-                  <a:srgbClr val="282828"/>
-                </a:solidFill>
-              </a:rPr>
-            </a:br>
-            <a:r>
-              <a:rPr lang="en-US" dirty="0">
-                <a:solidFill>
-                  <a:srgbClr val="282828"/>
-                </a:solidFill>
-              </a:rPr>
-              <a:t>- </a:t>
-            </a:r>
-            <a:r>
-              <a:rPr lang="en-US" dirty="0" err="1">
-                <a:solidFill>
-                  <a:srgbClr val="282828"/>
-                </a:solidFill>
-              </a:rPr>
-              <a:t>sourdough.ai</a:t>
-            </a:r>
-            <a:endParaRPr lang="en-US" dirty="0">
-              <a:solidFill>
-                <a:srgbClr val="282828"/>
-              </a:solidFill>
-            </a:endParaRPr>
-          </a:p>
-          <a:p>
-            <a:endParaRPr lang="en-US" dirty="0">
-              <a:solidFill>
-                <a:srgbClr val="282828"/>
-              </a:solidFill>
-            </a:endParaRPr>
-          </a:p>
-          <a:p>
-            <a:r>
-              <a:rPr lang="en-US" dirty="0" err="1">
-                <a:solidFill>
-                  <a:srgbClr val="282828"/>
-                </a:solidFill>
-              </a:rPr>
-              <a:t>ajvanbeest@protonmail.com</a:t>
-            </a:r>
-            <a:endParaRPr lang="en-US" dirty="0">
-              <a:solidFill>
-                <a:srgbClr val="282828"/>
-              </a:solidFill>
-            </a:endParaRPr>
-          </a:p>
-        </p:txBody>
-      </p:sp>
-    </p:spTree>
-    <p:extLst>
-      <p:ext uri="{BB962C8B-B14F-4D97-AF65-F5344CB8AC3E}">
-        <p14:creationId xmlns:p14="http://schemas.microsoft.com/office/powerpoint/2010/main" val="142843632"/>
-      </p:ext>
-    </p:extLst>
-  </p:cSld>
-  <p:clrMapOvr>
-    <a:masterClrMapping/>
-  </p:clrMapOvr>
-</p:sld>
-</file>
-
-<file path=ppt/slides/slide20.xml><?xml version="1.0" encoding="utf-8"?>
+<file path=ppt/slides/slide26.xml><?xml version="1.0" encoding="utf-8"?>
 <p:sld xmlns:a="http://schemas.openxmlformats.org/drawingml/2006/main" xmlns:r="http://schemas.openxmlformats.org/officeDocument/2006/relationships" xmlns:p="http://schemas.openxmlformats.org/presentationml/2006/main">
   <p:cSld>
     <p:bg>
@@ -4661,7 +5083,7 @@
 </p:sld>
 </file>
 
-<file path=ppt/slides/slide21.xml><?xml version="1.0" encoding="utf-8"?>
+<file path=ppt/slides/slide27.xml><?xml version="1.0" encoding="utf-8"?>
 <p:sld xmlns:a="http://schemas.openxmlformats.org/drawingml/2006/main" xmlns:r="http://schemas.openxmlformats.org/officeDocument/2006/relationships" xmlns:p="http://schemas.openxmlformats.org/presentationml/2006/main">
   <p:cSld>
     <p:bg>
@@ -4742,7 +5164,7 @@
 </p:sld>
 </file>
 
-<file path=ppt/slides/slide22.xml><?xml version="1.0" encoding="utf-8"?>
+<file path=ppt/slides/slide28.xml><?xml version="1.0" encoding="utf-8"?>
 <p:sld xmlns:a="http://schemas.openxmlformats.org/drawingml/2006/main" xmlns:r="http://schemas.openxmlformats.org/officeDocument/2006/relationships" xmlns:p="http://schemas.openxmlformats.org/presentationml/2006/main">
   <p:cSld>
     <p:bg>
@@ -4791,7 +5213,7 @@
         </p:nvSpPr>
         <p:spPr>
           <a:xfrm>
-            <a:off x="1524000" y="3429000"/>
+            <a:off x="1524000" y="2832100"/>
             <a:ext cx="9144000" cy="1193800"/>
           </a:xfrm>
         </p:spPr>
@@ -4807,29 +5229,15 @@
                   <a:srgbClr val="EBDCB3"/>
                 </a:solidFill>
               </a:rPr>
-              <a:t>Your turn </a:t>
-            </a:r>
-            <a:br>
-              <a:rPr lang="en-US" dirty="0">
+              <a:t>Your turn: </a:t>
+            </a:r>
+            <a:r>
+              <a:rPr lang="en-US" b="1" i="1" dirty="0">
                 <a:solidFill>
                   <a:srgbClr val="EBDCB3"/>
                 </a:solidFill>
               </a:rPr>
-            </a:br>
-            <a:br>
-              <a:rPr lang="en-US" dirty="0">
-                <a:solidFill>
-                  <a:srgbClr val="EBDCB3"/>
-                </a:solidFill>
-              </a:rPr>
-            </a:br>
-            <a:r>
-              <a:rPr lang="en-US" dirty="0">
-                <a:solidFill>
-                  <a:srgbClr val="EBDCB3"/>
-                </a:solidFill>
-              </a:rPr>
-              <a:t>(a cookbook)</a:t>
+              <a:t>A cookbook</a:t>
             </a:r>
           </a:p>
         </p:txBody>
@@ -4847,7 +5255,7 @@
 </p:sld>
 </file>
 
-<file path=ppt/slides/slide23.xml><?xml version="1.0" encoding="utf-8"?>
+<file path=ppt/slides/slide29.xml><?xml version="1.0" encoding="utf-8"?>
 <p:sld xmlns:a="http://schemas.openxmlformats.org/drawingml/2006/main" xmlns:r="http://schemas.openxmlformats.org/officeDocument/2006/relationships" xmlns:p="http://schemas.openxmlformats.org/presentationml/2006/main">
   <p:cSld>
     <p:spTree>
@@ -4913,7 +5321,204 @@
 </p:sld>
 </file>
 
-<file path=ppt/slides/slide24.xml><?xml version="1.0" encoding="utf-8"?>
+<file path=ppt/slides/slide3.xml><?xml version="1.0" encoding="utf-8"?>
+<p:sld xmlns:a="http://schemas.openxmlformats.org/drawingml/2006/main" xmlns:r="http://schemas.openxmlformats.org/officeDocument/2006/relationships" xmlns:p="http://schemas.openxmlformats.org/presentationml/2006/main">
+  <p:cSld>
+    <p:bg>
+      <p:bgPr>
+        <a:solidFill>
+          <a:srgbClr val="EBDCB3"/>
+        </a:solidFill>
+        <a:effectLst/>
+      </p:bgPr>
+    </p:bg>
+    <p:spTree>
+      <p:nvGrpSpPr>
+        <p:cNvPr id="1" name="">
+          <a:extLst>
+            <a:ext uri="{FF2B5EF4-FFF2-40B4-BE49-F238E27FC236}">
+              <a16:creationId xmlns:a16="http://schemas.microsoft.com/office/drawing/2014/main" id="{0F48F373-2938-66B6-0241-AEA7F1014D0F}"/>
+            </a:ext>
+          </a:extLst>
+        </p:cNvPr>
+        <p:cNvGrpSpPr/>
+        <p:nvPr/>
+      </p:nvGrpSpPr>
+      <p:grpSpPr>
+        <a:xfrm>
+          <a:off x="0" y="0"/>
+          <a:ext cx="0" cy="0"/>
+          <a:chOff x="0" y="0"/>
+          <a:chExt cx="0" cy="0"/>
+        </a:xfrm>
+      </p:grpSpPr>
+      <p:sp>
+        <p:nvSpPr>
+          <p:cNvPr id="3" name="Title 1">
+            <a:extLst>
+              <a:ext uri="{FF2B5EF4-FFF2-40B4-BE49-F238E27FC236}">
+                <a16:creationId xmlns:a16="http://schemas.microsoft.com/office/drawing/2014/main" id="{46D6C389-9F22-A4E6-AB31-4A7936B0CCA2}"/>
+              </a:ext>
+            </a:extLst>
+          </p:cNvPr>
+          <p:cNvSpPr txBox="1">
+            <a:spLocks/>
+          </p:cNvSpPr>
+          <p:nvPr/>
+        </p:nvSpPr>
+        <p:spPr>
+          <a:xfrm>
+            <a:off x="1046205" y="1988580"/>
+            <a:ext cx="10099589" cy="4363651"/>
+          </a:xfrm>
+          <a:prstGeom prst="rect">
+            <a:avLst/>
+          </a:prstGeom>
+        </p:spPr>
+        <p:txBody>
+          <a:bodyPr vert="horz" lIns="91440" tIns="45720" rIns="91440" bIns="45720" rtlCol="0" anchor="b">
+            <a:noAutofit/>
+          </a:bodyPr>
+          <a:lstStyle>
+            <a:lvl1pPr algn="ctr" defTabSz="914400" rtl="0" eaLnBrk="1" latinLnBrk="0" hangingPunct="1">
+              <a:lnSpc>
+                <a:spcPct val="90000"/>
+              </a:lnSpc>
+              <a:spcBef>
+                <a:spcPct val="0"/>
+              </a:spcBef>
+              <a:buNone/>
+              <a:defRPr sz="6000" kern="1200">
+                <a:solidFill>
+                  <a:schemeClr val="tx1"/>
+                </a:solidFill>
+                <a:latin typeface="+mj-lt"/>
+                <a:ea typeface="+mj-ea"/>
+                <a:cs typeface="+mj-cs"/>
+              </a:defRPr>
+            </a:lvl1pPr>
+          </a:lstStyle>
+          <a:p>
+            <a:r>
+              <a:rPr lang="en-US" dirty="0" err="1">
+                <a:solidFill>
+                  <a:srgbClr val="282828"/>
+                </a:solidFill>
+              </a:rPr>
+              <a:t>daemon.ajvanbeest.com</a:t>
+            </a:r>
+            <a:br>
+              <a:rPr lang="en-US" dirty="0">
+                <a:solidFill>
+                  <a:srgbClr val="282828"/>
+                </a:solidFill>
+              </a:rPr>
+            </a:br>
+            <a:br>
+              <a:rPr lang="en-US" dirty="0">
+                <a:solidFill>
+                  <a:srgbClr val="282828"/>
+                </a:solidFill>
+              </a:rPr>
+            </a:br>
+            <a:r>
+              <a:rPr lang="en-US" dirty="0" err="1">
+                <a:solidFill>
+                  <a:srgbClr val="282828"/>
+                </a:solidFill>
+              </a:rPr>
+              <a:t>github.com</a:t>
+            </a:r>
+            <a:r>
+              <a:rPr lang="en-US" dirty="0">
+                <a:solidFill>
+                  <a:srgbClr val="282828"/>
+                </a:solidFill>
+              </a:rPr>
+              <a:t>/theaj42</a:t>
+            </a:r>
+            <a:br>
+              <a:rPr lang="en-US" dirty="0">
+                <a:solidFill>
+                  <a:srgbClr val="282828"/>
+                </a:solidFill>
+              </a:rPr>
+            </a:br>
+            <a:r>
+              <a:rPr lang="en-US" dirty="0">
+                <a:solidFill>
+                  <a:srgbClr val="282828"/>
+                </a:solidFill>
+              </a:rPr>
+              <a:t>- presentations</a:t>
+            </a:r>
+            <a:br>
+              <a:rPr lang="en-US" dirty="0">
+                <a:solidFill>
+                  <a:srgbClr val="282828"/>
+                </a:solidFill>
+              </a:rPr>
+            </a:br>
+            <a:r>
+              <a:rPr lang="en-US" dirty="0">
+                <a:solidFill>
+                  <a:srgbClr val="282828"/>
+                </a:solidFill>
+              </a:rPr>
+              <a:t>- </a:t>
+            </a:r>
+            <a:r>
+              <a:rPr lang="en-US" dirty="0" err="1">
+                <a:solidFill>
+                  <a:srgbClr val="282828"/>
+                </a:solidFill>
+              </a:rPr>
+              <a:t>sourdough.ai</a:t>
+            </a:r>
+            <a:endParaRPr lang="en-US" dirty="0">
+              <a:solidFill>
+                <a:srgbClr val="282828"/>
+              </a:solidFill>
+            </a:endParaRPr>
+          </a:p>
+          <a:p>
+            <a:endParaRPr lang="en-US" dirty="0">
+              <a:solidFill>
+                <a:srgbClr val="282828"/>
+              </a:solidFill>
+            </a:endParaRPr>
+          </a:p>
+          <a:p>
+            <a:r>
+              <a:rPr lang="en-US" dirty="0" err="1">
+                <a:solidFill>
+                  <a:srgbClr val="282828"/>
+                </a:solidFill>
+              </a:rPr>
+              <a:t>ajvanbeest@protonmail.com</a:t>
+            </a:r>
+            <a:endParaRPr lang="en-US" dirty="0">
+              <a:solidFill>
+                <a:srgbClr val="282828"/>
+              </a:solidFill>
+            </a:endParaRPr>
+          </a:p>
+        </p:txBody>
+      </p:sp>
+    </p:spTree>
+    <p:extLst>
+      <p:ext uri="{BB962C8B-B14F-4D97-AF65-F5344CB8AC3E}">
+        <p14:creationId xmlns:p14="http://schemas.microsoft.com/office/powerpoint/2010/main" val="142843632"/>
+      </p:ext>
+    </p:extLst>
+  </p:cSld>
+  <p:clrMapOvr>
+    <a:masterClrMapping/>
+  </p:clrMapOvr>
+</p:sld>
+</file>
+
+<file path=ppt/slides/slide30.xml><?xml version="1.0" encoding="utf-8"?>
 <p:sld xmlns:a="http://schemas.openxmlformats.org/drawingml/2006/main" xmlns:r="http://schemas.openxmlformats.org/officeDocument/2006/relationships" xmlns:p="http://schemas.openxmlformats.org/presentationml/2006/main">
   <p:cSld>
     <p:bg>
@@ -4994,7 +5599,7 @@
 </p:sld>
 </file>
 
-<file path=ppt/slides/slide25.xml><?xml version="1.0" encoding="utf-8"?>
+<file path=ppt/slides/slide31.xml><?xml version="1.0" encoding="utf-8"?>
 <p:sld xmlns:a="http://schemas.openxmlformats.org/drawingml/2006/main" xmlns:r="http://schemas.openxmlformats.org/officeDocument/2006/relationships" xmlns:p="http://schemas.openxmlformats.org/presentationml/2006/main">
   <p:cSld>
     <p:bg>
@@ -5075,7 +5680,7 @@
 </p:sld>
 </file>
 
-<file path=ppt/slides/slide26.xml><?xml version="1.0" encoding="utf-8"?>
+<file path=ppt/slides/slide32.xml><?xml version="1.0" encoding="utf-8"?>
 <p:sld xmlns:a="http://schemas.openxmlformats.org/drawingml/2006/main" xmlns:r="http://schemas.openxmlformats.org/officeDocument/2006/relationships" xmlns:p="http://schemas.openxmlformats.org/presentationml/2006/main">
   <p:cSld>
     <p:bg>
@@ -5158,7 +5763,7 @@
 </p:sld>
 </file>
 
-<file path=ppt/slides/slide27.xml><?xml version="1.0" encoding="utf-8"?>
+<file path=ppt/slides/slide33.xml><?xml version="1.0" encoding="utf-8"?>
 <p:sld xmlns:a="http://schemas.openxmlformats.org/drawingml/2006/main" xmlns:r="http://schemas.openxmlformats.org/officeDocument/2006/relationships" xmlns:p="http://schemas.openxmlformats.org/presentationml/2006/main">
   <p:cSld>
     <p:bg>
@@ -5241,7 +5846,7 @@
 </p:sld>
 </file>
 
-<file path=ppt/slides/slide28.xml><?xml version="1.0" encoding="utf-8"?>
+<file path=ppt/slides/slide34.xml><?xml version="1.0" encoding="utf-8"?>
 <p:sld xmlns:a="http://schemas.openxmlformats.org/drawingml/2006/main" xmlns:r="http://schemas.openxmlformats.org/officeDocument/2006/relationships" xmlns:p="http://schemas.openxmlformats.org/presentationml/2006/main">
   <p:cSld>
     <p:bg>
@@ -5444,7 +6049,7 @@
 </p:sld>
 </file>
 
-<file path=ppt/slides/slide3.xml><?xml version="1.0" encoding="utf-8"?>
+<file path=ppt/slides/slide4.xml><?xml version="1.0" encoding="utf-8"?>
 <p:sld xmlns:a="http://schemas.openxmlformats.org/drawingml/2006/main" xmlns:r="http://schemas.openxmlformats.org/officeDocument/2006/relationships" xmlns:p="http://schemas.openxmlformats.org/presentationml/2006/main">
   <p:cSld>
     <p:bg>
@@ -5457,7 +6062,13 @@
     </p:bg>
     <p:spTree>
       <p:nvGrpSpPr>
-        <p:cNvPr id="1" name=""/>
+        <p:cNvPr id="1" name="">
+          <a:extLst>
+            <a:ext uri="{FF2B5EF4-FFF2-40B4-BE49-F238E27FC236}">
+              <a16:creationId xmlns:a16="http://schemas.microsoft.com/office/drawing/2014/main" id="{0FC889D7-490A-26D1-29E7-4FE2AC1950B4}"/>
+            </a:ext>
+          </a:extLst>
+        </p:cNvPr>
         <p:cNvGrpSpPr/>
         <p:nvPr/>
       </p:nvGrpSpPr>
@@ -5474,7 +6085,7 @@
           <p:cNvPr id="2" name="Title 1">
             <a:extLst>
               <a:ext uri="{FF2B5EF4-FFF2-40B4-BE49-F238E27FC236}">
-                <a16:creationId xmlns:a16="http://schemas.microsoft.com/office/drawing/2014/main" id="{89BB42BB-592E-5235-9C0D-ECAFA567F99E}"/>
+                <a16:creationId xmlns:a16="http://schemas.microsoft.com/office/drawing/2014/main" id="{4AC47A0C-C972-43AA-7884-178F59FD8978}"/>
               </a:ext>
             </a:extLst>
           </p:cNvPr>
@@ -5517,7 +6128,7 @@
     </p:spTree>
     <p:extLst>
       <p:ext uri="{BB962C8B-B14F-4D97-AF65-F5344CB8AC3E}">
-        <p14:creationId xmlns:p14="http://schemas.microsoft.com/office/powerpoint/2010/main" val="531412031"/>
+        <p14:creationId xmlns:p14="http://schemas.microsoft.com/office/powerpoint/2010/main" val="1745258642"/>
       </p:ext>
     </p:extLst>
   </p:cSld>
@@ -5527,7 +6138,7 @@
 </p:sld>
 </file>
 
-<file path=ppt/slides/slide4.xml><?xml version="1.0" encoding="utf-8"?>
+<file path=ppt/slides/slide5.xml><?xml version="1.0" encoding="utf-8"?>
 <p:sld xmlns:a="http://schemas.openxmlformats.org/drawingml/2006/main" xmlns:r="http://schemas.openxmlformats.org/officeDocument/2006/relationships" xmlns:p="http://schemas.openxmlformats.org/presentationml/2006/main">
   <p:cSld>
     <p:bg>
@@ -5635,7 +6246,7 @@
 </p:sld>
 </file>
 
-<file path=ppt/slides/slide5.xml><?xml version="1.0" encoding="utf-8"?>
+<file path=ppt/slides/slide6.xml><?xml version="1.0" encoding="utf-8"?>
 <p:sld xmlns:a="http://schemas.openxmlformats.org/drawingml/2006/main" xmlns:r="http://schemas.openxmlformats.org/officeDocument/2006/relationships" xmlns:p="http://schemas.openxmlformats.org/presentationml/2006/main">
   <p:cSld>
     <p:bg>
@@ -5716,7 +6327,7 @@
 </p:sld>
 </file>
 
-<file path=ppt/slides/slide6.xml><?xml version="1.0" encoding="utf-8"?>
+<file path=ppt/slides/slide7.xml><?xml version="1.0" encoding="utf-8"?>
 <p:sld xmlns:a="http://schemas.openxmlformats.org/drawingml/2006/main" xmlns:r="http://schemas.openxmlformats.org/officeDocument/2006/relationships" xmlns:p="http://schemas.openxmlformats.org/presentationml/2006/main">
   <p:cSld>
     <p:bg>
@@ -5797,7 +6408,7 @@
 </p:sld>
 </file>
 
-<file path=ppt/slides/slide7.xml><?xml version="1.0" encoding="utf-8"?>
+<file path=ppt/slides/slide8.xml><?xml version="1.0" encoding="utf-8"?>
 <p:sld xmlns:a="http://schemas.openxmlformats.org/drawingml/2006/main" xmlns:r="http://schemas.openxmlformats.org/officeDocument/2006/relationships" xmlns:p="http://schemas.openxmlformats.org/presentationml/2006/main">
   <p:cSld>
     <p:bg>
@@ -5878,7 +6489,7 @@
 </p:sld>
 </file>
 
-<file path=ppt/slides/slide8.xml><?xml version="1.0" encoding="utf-8"?>
+<file path=ppt/slides/slide9.xml><?xml version="1.0" encoding="utf-8"?>
 <p:sld xmlns:a="http://schemas.openxmlformats.org/drawingml/2006/main" xmlns:r="http://schemas.openxmlformats.org/officeDocument/2006/relationships" xmlns:p="http://schemas.openxmlformats.org/presentationml/2006/main">
   <p:cSld>
     <p:bg>
@@ -5936,21 +6547,42 @@
           <a:lstStyle/>
           <a:p>
             <a:r>
+              <a:rPr lang="en-US" dirty="0" err="1">
+                <a:solidFill>
+                  <a:srgbClr val="EBDCB3"/>
+                </a:solidFill>
+              </a:rPr>
+              <a:t>Whaddya</a:t>
+            </a:r>
+            <a:r>
               <a:rPr lang="en-US" dirty="0">
                 <a:solidFill>
                   <a:srgbClr val="EBDCB3"/>
                 </a:solidFill>
               </a:rPr>
-              <a:t>So I built </a:t>
-            </a:r>
-            <a:r>
-              <a:rPr lang="en-US" i="1" dirty="0">
+              <a:t> mean, </a:t>
+            </a:r>
+            <a:r>
+              <a:rPr lang="en-US" b="1" i="1" dirty="0">
                 <a:solidFill>
                   <a:srgbClr val="EBDCB3"/>
                 </a:solidFill>
               </a:rPr>
-              <a:t>a thing</a:t>
-            </a:r>
+              <a:t>Agentic</a:t>
+            </a:r>
+            <a:r>
+              <a:rPr lang="en-US" dirty="0">
+                <a:solidFill>
+                  <a:srgbClr val="EBDCB3"/>
+                </a:solidFill>
+              </a:rPr>
+              <a:t>?</a:t>
+            </a:r>
+            <a:endParaRPr lang="en-US" i="1" dirty="0">
+              <a:solidFill>
+                <a:srgbClr val="EBDCB3"/>
+              </a:solidFill>
+            </a:endParaRPr>
           </a:p>
         </p:txBody>
       </p:sp>
@@ -5958,72 +6590,6 @@
     <p:extLst>
       <p:ext uri="{BB962C8B-B14F-4D97-AF65-F5344CB8AC3E}">
         <p14:creationId xmlns:p14="http://schemas.microsoft.com/office/powerpoint/2010/main" val="2326516040"/>
-      </p:ext>
-    </p:extLst>
-  </p:cSld>
-  <p:clrMapOvr>
-    <a:masterClrMapping/>
-  </p:clrMapOvr>
-</p:sld>
-</file>
-
-<file path=ppt/slides/slide9.xml><?xml version="1.0" encoding="utf-8"?>
-<p:sld xmlns:a="http://schemas.openxmlformats.org/drawingml/2006/main" xmlns:r="http://schemas.openxmlformats.org/officeDocument/2006/relationships" xmlns:p="http://schemas.openxmlformats.org/presentationml/2006/main">
-  <p:cSld>
-    <p:spTree>
-      <p:nvGrpSpPr>
-        <p:cNvPr id="1" name="">
-          <a:extLst>
-            <a:ext uri="{FF2B5EF4-FFF2-40B4-BE49-F238E27FC236}">
-              <a16:creationId xmlns:a16="http://schemas.microsoft.com/office/drawing/2014/main" id="{25B1A5A2-C726-FE4D-CECD-6DF17FA4062A}"/>
-            </a:ext>
-          </a:extLst>
-        </p:cNvPr>
-        <p:cNvGrpSpPr/>
-        <p:nvPr/>
-      </p:nvGrpSpPr>
-      <p:grpSpPr>
-        <a:xfrm>
-          <a:off x="0" y="0"/>
-          <a:ext cx="0" cy="0"/>
-          <a:chOff x="0" y="0"/>
-          <a:chExt cx="0" cy="0"/>
-        </a:xfrm>
-      </p:grpSpPr>
-      <p:pic>
-        <p:nvPicPr>
-          <p:cNvPr id="11" name="Picture 10" descr="A screenshot of a computer&#10;&#10;AI-generated content may be incorrect.">
-            <a:extLst>
-              <a:ext uri="{FF2B5EF4-FFF2-40B4-BE49-F238E27FC236}">
-                <a16:creationId xmlns:a16="http://schemas.microsoft.com/office/drawing/2014/main" id="{4AD2C7E2-51B6-44B5-EEF9-0EA95DCF3BA4}"/>
-              </a:ext>
-            </a:extLst>
-          </p:cNvPr>
-          <p:cNvPicPr>
-            <a:picLocks noChangeAspect="1"/>
-          </p:cNvPicPr>
-          <p:nvPr/>
-        </p:nvPicPr>
-        <p:blipFill>
-          <a:blip r:embed="rId2"/>
-          <a:stretch>
-            <a:fillRect/>
-          </a:stretch>
-        </p:blipFill>
-        <p:spPr>
-          <a:xfrm>
-            <a:off x="-15300" y="-12357"/>
-            <a:ext cx="12345460" cy="6969211"/>
-          </a:xfrm>
-          <a:prstGeom prst="rect">
-            <a:avLst/>
-          </a:prstGeom>
-        </p:spPr>
-      </p:pic>
-    </p:spTree>
-    <p:extLst>
-      <p:ext uri="{BB962C8B-B14F-4D97-AF65-F5344CB8AC3E}">
-        <p14:creationId xmlns:p14="http://schemas.microsoft.com/office/powerpoint/2010/main" val="3431341621"/>
       </p:ext>
     </p:extLst>
   </p:cSld>

</xml_diff>